<commit_message>
updated presentation with one slide
</commit_message>
<xml_diff>
--- a/Presentation.pptx
+++ b/Presentation.pptx
@@ -10,14 +10,15 @@
     <p:sldId id="260" r:id="rId4"/>
     <p:sldId id="261" r:id="rId5"/>
     <p:sldId id="259" r:id="rId6"/>
-    <p:sldId id="267" r:id="rId7"/>
-    <p:sldId id="268" r:id="rId8"/>
-    <p:sldId id="269" r:id="rId9"/>
-    <p:sldId id="263" r:id="rId10"/>
-    <p:sldId id="264" r:id="rId11"/>
-    <p:sldId id="265" r:id="rId12"/>
-    <p:sldId id="258" r:id="rId13"/>
-    <p:sldId id="266" r:id="rId14"/>
+    <p:sldId id="270" r:id="rId7"/>
+    <p:sldId id="267" r:id="rId8"/>
+    <p:sldId id="268" r:id="rId9"/>
+    <p:sldId id="269" r:id="rId10"/>
+    <p:sldId id="263" r:id="rId11"/>
+    <p:sldId id="264" r:id="rId12"/>
+    <p:sldId id="265" r:id="rId13"/>
+    <p:sldId id="258" r:id="rId14"/>
+    <p:sldId id="266" r:id="rId15"/>
   </p:sldIdLst>
   <p:sldSz cx="9144000" cy="6858000" type="screen4x3"/>
   <p:notesSz cx="6858000" cy="9144000"/>
@@ -3834,7 +3835,7 @@
           <a:p>
             <a:r>
               <a:rPr lang="en-US" dirty="0" smtClean="0"/>
-              <a:t>Difficulties</a:t>
+              <a:t>Development Status</a:t>
             </a:r>
             <a:endParaRPr lang="en-US" dirty="0"/>
           </a:p>
@@ -3852,78 +3853,58 @@
         </p:nvSpPr>
         <p:spPr/>
         <p:txBody>
-          <a:bodyPr>
-            <a:normAutofit/>
-          </a:bodyPr>
-          <a:lstStyle/>
-          <a:p>
+          <a:bodyPr/>
+          <a:lstStyle/>
+          <a:p>
+            <a:pPr>
+              <a:lnSpc>
+                <a:spcPct val="120000"/>
+              </a:lnSpc>
+            </a:pPr>
             <a:r>
               <a:rPr lang="en-US" dirty="0" smtClean="0"/>
-              <a:t>Making Floating Action Button “float”</a:t>
-            </a:r>
-          </a:p>
-          <a:p>
-            <a:pPr lvl="1"/>
+              <a:t>Logo Activity</a:t>
+            </a:r>
+          </a:p>
+          <a:p>
+            <a:pPr>
+              <a:lnSpc>
+                <a:spcPct val="120000"/>
+              </a:lnSpc>
+            </a:pPr>
             <a:r>
               <a:rPr lang="en-US" dirty="0" smtClean="0"/>
-              <a:t>Needed to use </a:t>
-            </a:r>
-            <a:r>
-              <a:rPr lang="en-US" dirty="0" err="1"/>
-              <a:t>app:borderWidth</a:t>
-            </a:r>
-            <a:r>
-              <a:rPr lang="en-US" dirty="0"/>
-              <a:t>="</a:t>
-            </a:r>
+              <a:t>Authentication Activity (using PIN)</a:t>
+            </a:r>
+          </a:p>
+          <a:p>
+            <a:pPr>
+              <a:lnSpc>
+                <a:spcPct val="120000"/>
+              </a:lnSpc>
+            </a:pPr>
             <a:r>
               <a:rPr lang="en-US" dirty="0" smtClean="0"/>
-              <a:t>0dp“</a:t>
-            </a:r>
-          </a:p>
-          <a:p>
+              <a:t>Home Activity with Image Feed</a:t>
+            </a:r>
+          </a:p>
+          <a:p>
+            <a:pPr>
+              <a:lnSpc>
+                <a:spcPct val="120000"/>
+              </a:lnSpc>
+            </a:pPr>
             <a:r>
               <a:rPr lang="en-US" dirty="0" smtClean="0"/>
-              <a:t>Using toasts inside an </a:t>
-            </a:r>
-            <a:r>
-              <a:rPr lang="en-US" dirty="0" err="1" smtClean="0"/>
-              <a:t>AsyncTask</a:t>
-            </a:r>
-            <a:endParaRPr lang="en-US" dirty="0"/>
-          </a:p>
-          <a:p>
-            <a:r>
-              <a:rPr lang="en-US" dirty="0" smtClean="0"/>
-              <a:t>Implementing side navigation pop-out</a:t>
-            </a:r>
-            <a:endParaRPr lang="en-US" dirty="0"/>
-          </a:p>
-          <a:p>
-            <a:r>
-              <a:rPr lang="en-US" dirty="0" err="1" smtClean="0"/>
-              <a:t>Debouncing</a:t>
-            </a:r>
-            <a:r>
-              <a:rPr lang="en-US" dirty="0" smtClean="0"/>
-              <a:t> the image search </a:t>
-            </a:r>
-            <a:r>
-              <a:rPr lang="en-US" dirty="0" err="1" smtClean="0"/>
-              <a:t>keyup</a:t>
-            </a:r>
-            <a:r>
-              <a:rPr lang="en-US" dirty="0" smtClean="0"/>
-              <a:t> event</a:t>
-            </a:r>
-            <a:endParaRPr lang="en-US" dirty="0"/>
+              <a:t>Search Activity with Remote File-System</a:t>
+            </a:r>
           </a:p>
         </p:txBody>
       </p:sp>
     </p:spTree>
     <p:extLst>
       <p:ext uri="{BB962C8B-B14F-4D97-AF65-F5344CB8AC3E}">
-        <p14:creationId xmlns:p14="http://schemas.microsoft.com/office/powerpoint/2010/main" val="1556519456"/>
+        <p14:creationId xmlns:p14="http://schemas.microsoft.com/office/powerpoint/2010/main" val="3231469236"/>
       </p:ext>
     </p:extLst>
   </p:cSld>
@@ -3974,7 +3955,7 @@
           <a:p>
             <a:r>
               <a:rPr lang="en-US" dirty="0" smtClean="0"/>
-              <a:t>Future Work</a:t>
+              <a:t>Difficulties</a:t>
             </a:r>
             <a:endParaRPr lang="en-US" dirty="0"/>
           </a:p>
@@ -3992,45 +3973,78 @@
         </p:nvSpPr>
         <p:spPr/>
         <p:txBody>
-          <a:bodyPr/>
+          <a:bodyPr>
+            <a:normAutofit/>
+          </a:bodyPr>
           <a:lstStyle/>
           <a:p>
             <a:r>
               <a:rPr lang="en-US" dirty="0" smtClean="0"/>
-              <a:t>Complete side navigation</a:t>
-            </a:r>
-          </a:p>
-          <a:p>
+              <a:t>Making Floating Action Button “float”</a:t>
+            </a:r>
+          </a:p>
+          <a:p>
+            <a:pPr lvl="1"/>
             <a:r>
               <a:rPr lang="en-US" dirty="0" smtClean="0"/>
-              <a:t>Allow multiple folders for files</a:t>
-            </a:r>
-          </a:p>
-          <a:p>
+              <a:t>Needed to use </a:t>
+            </a:r>
+            <a:r>
+              <a:rPr lang="en-US" dirty="0" err="1"/>
+              <a:t>app:borderWidth</a:t>
+            </a:r>
+            <a:r>
+              <a:rPr lang="en-US" dirty="0"/>
+              <a:t>="</a:t>
+            </a:r>
             <a:r>
               <a:rPr lang="en-US" dirty="0" smtClean="0"/>
-              <a:t>Clean up UI, particularly Menu Actions</a:t>
+              <a:t>0dp“</a:t>
             </a:r>
           </a:p>
           <a:p>
             <a:r>
               <a:rPr lang="en-US" dirty="0" smtClean="0"/>
-              <a:t>Implement searching images stored on phone</a:t>
-            </a:r>
+              <a:t>Using toasts inside an </a:t>
+            </a:r>
+            <a:r>
+              <a:rPr lang="en-US" dirty="0" err="1" smtClean="0"/>
+              <a:t>AsyncTask</a:t>
+            </a:r>
+            <a:endParaRPr lang="en-US" dirty="0"/>
           </a:p>
           <a:p>
             <a:r>
               <a:rPr lang="en-US" dirty="0" smtClean="0"/>
-              <a:t>Create transitions between Activities</a:t>
-            </a:r>
-            <a:endParaRPr lang="en-US" dirty="0" smtClean="0"/>
+              <a:t>Implementing side navigation pop-out</a:t>
+            </a:r>
+            <a:endParaRPr lang="en-US" dirty="0"/>
+          </a:p>
+          <a:p>
+            <a:r>
+              <a:rPr lang="en-US" dirty="0" err="1" smtClean="0"/>
+              <a:t>Debouncing</a:t>
+            </a:r>
+            <a:r>
+              <a:rPr lang="en-US" dirty="0" smtClean="0"/>
+              <a:t> the image search </a:t>
+            </a:r>
+            <a:r>
+              <a:rPr lang="en-US" dirty="0" err="1" smtClean="0"/>
+              <a:t>keyup</a:t>
+            </a:r>
+            <a:r>
+              <a:rPr lang="en-US" dirty="0" smtClean="0"/>
+              <a:t> event</a:t>
+            </a:r>
+            <a:endParaRPr lang="en-US" dirty="0"/>
           </a:p>
         </p:txBody>
       </p:sp>
     </p:spTree>
     <p:extLst>
       <p:ext uri="{BB962C8B-B14F-4D97-AF65-F5344CB8AC3E}">
-        <p14:creationId xmlns:p14="http://schemas.microsoft.com/office/powerpoint/2010/main" val="3007665841"/>
+        <p14:creationId xmlns:p14="http://schemas.microsoft.com/office/powerpoint/2010/main" val="1556519456"/>
       </p:ext>
     </p:extLst>
   </p:cSld>
@@ -4081,6 +4095,112 @@
           <a:p>
             <a:r>
               <a:rPr lang="en-US" dirty="0" smtClean="0"/>
+              <a:t>Future Work</a:t>
+            </a:r>
+            <a:endParaRPr lang="en-US" dirty="0"/>
+          </a:p>
+        </p:txBody>
+      </p:sp>
+      <p:sp>
+        <p:nvSpPr>
+          <p:cNvPr id="3" name="Content Placeholder 2"/>
+          <p:cNvSpPr>
+            <a:spLocks noGrp="1"/>
+          </p:cNvSpPr>
+          <p:nvPr>
+            <p:ph idx="1"/>
+          </p:nvPr>
+        </p:nvSpPr>
+        <p:spPr/>
+        <p:txBody>
+          <a:bodyPr/>
+          <a:lstStyle/>
+          <a:p>
+            <a:r>
+              <a:rPr lang="en-US" dirty="0" smtClean="0"/>
+              <a:t>Complete side navigation</a:t>
+            </a:r>
+          </a:p>
+          <a:p>
+            <a:r>
+              <a:rPr lang="en-US" dirty="0" smtClean="0"/>
+              <a:t>Allow multiple folders for files</a:t>
+            </a:r>
+          </a:p>
+          <a:p>
+            <a:r>
+              <a:rPr lang="en-US" dirty="0" smtClean="0"/>
+              <a:t>Clean up UI, particularly Menu Actions</a:t>
+            </a:r>
+          </a:p>
+          <a:p>
+            <a:r>
+              <a:rPr lang="en-US" dirty="0" smtClean="0"/>
+              <a:t>Implement searching images stored on phone</a:t>
+            </a:r>
+          </a:p>
+          <a:p>
+            <a:r>
+              <a:rPr lang="en-US" dirty="0" smtClean="0"/>
+              <a:t>Create transitions between Activities</a:t>
+            </a:r>
+          </a:p>
+        </p:txBody>
+      </p:sp>
+    </p:spTree>
+    <p:extLst>
+      <p:ext uri="{BB962C8B-B14F-4D97-AF65-F5344CB8AC3E}">
+        <p14:creationId xmlns:p14="http://schemas.microsoft.com/office/powerpoint/2010/main" val="3007665841"/>
+      </p:ext>
+    </p:extLst>
+  </p:cSld>
+  <p:clrMapOvr>
+    <a:masterClrMapping/>
+  </p:clrMapOvr>
+  <p:timing>
+    <p:tnLst>
+      <p:par>
+        <p:cTn id="1" dur="indefinite" restart="never" nodeType="tmRoot"/>
+      </p:par>
+    </p:tnLst>
+  </p:timing>
+</p:sld>
+</file>
+
+<file path=ppt/slides/slide13.xml><?xml version="1.0" encoding="utf-8"?>
+<p:sld xmlns:a="http://schemas.openxmlformats.org/drawingml/2006/main" xmlns:r="http://schemas.openxmlformats.org/officeDocument/2006/relationships" xmlns:p="http://schemas.openxmlformats.org/presentationml/2006/main">
+  <p:cSld>
+    <p:spTree>
+      <p:nvGrpSpPr>
+        <p:cNvPr id="1" name=""/>
+        <p:cNvGrpSpPr/>
+        <p:nvPr/>
+      </p:nvGrpSpPr>
+      <p:grpSpPr>
+        <a:xfrm>
+          <a:off x="0" y="0"/>
+          <a:ext cx="0" cy="0"/>
+          <a:chOff x="0" y="0"/>
+          <a:chExt cx="0" cy="0"/>
+        </a:xfrm>
+      </p:grpSpPr>
+      <p:sp>
+        <p:nvSpPr>
+          <p:cNvPr id="2" name="Title 1"/>
+          <p:cNvSpPr>
+            <a:spLocks noGrp="1"/>
+          </p:cNvSpPr>
+          <p:nvPr>
+            <p:ph type="title"/>
+          </p:nvPr>
+        </p:nvSpPr>
+        <p:spPr/>
+        <p:txBody>
+          <a:bodyPr/>
+          <a:lstStyle/>
+          <a:p>
+            <a:r>
+              <a:rPr lang="en-US" dirty="0" smtClean="0"/>
               <a:t>Link to Wiki</a:t>
             </a:r>
             <a:endParaRPr lang="en-US" dirty="0"/>
@@ -4143,7 +4263,7 @@
 </p:sld>
 </file>
 
-<file path=ppt/slides/slide13.xml><?xml version="1.0" encoding="utf-8"?>
+<file path=ppt/slides/slide14.xml><?xml version="1.0" encoding="utf-8"?>
 <p:sld xmlns:a="http://schemas.openxmlformats.org/drawingml/2006/main" xmlns:r="http://schemas.openxmlformats.org/officeDocument/2006/relationships" xmlns:p="http://schemas.openxmlformats.org/presentationml/2006/main">
   <p:cSld>
     <p:spTree>
@@ -4307,7 +4427,6 @@
               <a:rPr lang="en-US" dirty="0" smtClean="0"/>
               <a:t>Concept &amp; Similar Apps</a:t>
             </a:r>
-            <a:endParaRPr lang="en-US" dirty="0" smtClean="0"/>
           </a:p>
           <a:p>
             <a:pPr>
@@ -4319,7 +4438,6 @@
               <a:rPr lang="en-US" dirty="0" smtClean="0"/>
               <a:t>A Typical User</a:t>
             </a:r>
-            <a:endParaRPr lang="en-US" dirty="0" smtClean="0"/>
           </a:p>
           <a:p>
             <a:pPr>
@@ -4331,7 +4449,6 @@
               <a:rPr lang="en-US" dirty="0" smtClean="0"/>
               <a:t>Features &amp; Support</a:t>
             </a:r>
-            <a:endParaRPr lang="en-US" dirty="0" smtClean="0"/>
           </a:p>
           <a:p>
             <a:pPr>
@@ -4374,11 +4491,7 @@
             </a:pPr>
             <a:r>
               <a:rPr lang="en-US" dirty="0" smtClean="0"/>
-              <a:t>Future </a:t>
-            </a:r>
-            <a:r>
-              <a:rPr lang="en-US" dirty="0" smtClean="0"/>
-              <a:t>work</a:t>
+              <a:t>Future work</a:t>
             </a:r>
           </a:p>
           <a:p>
@@ -4395,7 +4508,6 @@
               <a:rPr lang="en-US" dirty="0" smtClean="0"/>
               <a:t>Wiki</a:t>
             </a:r>
-            <a:endParaRPr lang="en-US" dirty="0" smtClean="0"/>
           </a:p>
           <a:p>
             <a:pPr>
@@ -4491,13 +4603,8 @@
             </a:pPr>
             <a:r>
               <a:rPr lang="en-US" dirty="0" smtClean="0"/>
-              <a:t>Image </a:t>
-            </a:r>
-            <a:r>
-              <a:rPr lang="en-US" dirty="0" smtClean="0"/>
-              <a:t>Gallery Application</a:t>
-            </a:r>
-            <a:endParaRPr lang="en-US" dirty="0" smtClean="0"/>
+              <a:t>Image Gallery Application</a:t>
+            </a:r>
           </a:p>
           <a:p>
             <a:pPr>
@@ -4520,7 +4627,6 @@
               <a:rPr lang="en-US" dirty="0" smtClean="0"/>
               <a:t>Can access images stored at a secure remote file-system</a:t>
             </a:r>
-            <a:endParaRPr lang="en-US" dirty="0" smtClean="0"/>
           </a:p>
           <a:p>
             <a:pPr>
@@ -4659,7 +4765,6 @@
               <a:rPr lang="en-US" dirty="0" smtClean="0"/>
               <a:t>Someone who is concerned about the privacy of their images</a:t>
             </a:r>
-            <a:endParaRPr lang="en-US" dirty="0" smtClean="0"/>
           </a:p>
           <a:p>
             <a:pPr>
@@ -4693,7 +4798,6 @@
               <a:rPr lang="en-US" dirty="0" smtClean="0"/>
               <a:t>Someone who is potentially technical enough to host their images on a remote repository for access</a:t>
             </a:r>
-            <a:endParaRPr lang="en-US" dirty="0" smtClean="0"/>
           </a:p>
           <a:p>
             <a:pPr>
@@ -4800,7 +4904,6 @@
               <a:rPr lang="en-US" dirty="0" smtClean="0"/>
               <a:t>View all images in an Instagram-like format</a:t>
             </a:r>
-            <a:endParaRPr lang="en-US" dirty="0" smtClean="0"/>
           </a:p>
           <a:p>
             <a:pPr>
@@ -4812,7 +4915,6 @@
               <a:rPr lang="en-US" dirty="0" smtClean="0"/>
               <a:t>Search for images by tag</a:t>
             </a:r>
-            <a:endParaRPr lang="en-US" dirty="0" smtClean="0"/>
           </a:p>
           <a:p>
             <a:pPr>
@@ -4893,7 +4995,7 @@
           <a:p>
             <a:r>
               <a:rPr lang="en-US" dirty="0" smtClean="0"/>
-              <a:t>Screenshots</a:t>
+              <a:t>Technologies Used</a:t>
             </a:r>
             <a:endParaRPr lang="en-US" dirty="0"/>
           </a:p>
@@ -4901,119 +5003,62 @@
       </p:sp>
       <p:sp>
         <p:nvSpPr>
-          <p:cNvPr id="3" name="Text Placeholder 2"/>
-          <p:cNvSpPr>
-            <a:spLocks noGrp="1"/>
-          </p:cNvSpPr>
-          <p:nvPr>
-            <p:ph type="body" idx="1"/>
-          </p:nvPr>
-        </p:nvSpPr>
-        <p:spPr/>
-        <p:txBody>
-          <a:bodyPr/>
-          <a:lstStyle/>
-          <a:p>
-            <a:pPr algn="ctr"/>
+          <p:cNvPr id="3" name="Content Placeholder 2"/>
+          <p:cNvSpPr>
+            <a:spLocks noGrp="1"/>
+          </p:cNvSpPr>
+          <p:nvPr>
+            <p:ph idx="1"/>
+          </p:nvPr>
+        </p:nvSpPr>
+        <p:spPr/>
+        <p:txBody>
+          <a:bodyPr/>
+          <a:lstStyle/>
+          <a:p>
             <a:r>
               <a:rPr lang="en-US" dirty="0" smtClean="0"/>
-              <a:t>Logo Page</a:t>
-            </a:r>
-            <a:endParaRPr lang="en-US" dirty="0"/>
-          </a:p>
-        </p:txBody>
-      </p:sp>
-      <p:sp>
-        <p:nvSpPr>
-          <p:cNvPr id="4" name="Text Placeholder 3"/>
-          <p:cNvSpPr>
-            <a:spLocks noGrp="1"/>
-          </p:cNvSpPr>
-          <p:nvPr>
-            <p:ph type="body" sz="half" idx="3"/>
-          </p:nvPr>
-        </p:nvSpPr>
-        <p:spPr/>
-        <p:txBody>
-          <a:bodyPr/>
-          <a:lstStyle/>
-          <a:p>
-            <a:pPr algn="ctr"/>
+              <a:t>Android Studio</a:t>
+            </a:r>
+          </a:p>
+          <a:p>
             <a:r>
               <a:rPr lang="en-US" dirty="0" smtClean="0"/>
-              <a:t>PIN Page</a:t>
-            </a:r>
-            <a:endParaRPr lang="en-US" dirty="0"/>
-          </a:p>
-        </p:txBody>
-      </p:sp>
-      <p:pic>
-        <p:nvPicPr>
-          <p:cNvPr id="7" name="Content Placeholder 6" descr="Screen Shot1.png"/>
-          <p:cNvPicPr>
-            <a:picLocks noGrp="1" noChangeAspect="1"/>
-          </p:cNvPicPr>
-          <p:nvPr>
-            <p:ph sz="quarter" idx="2"/>
-          </p:nvPr>
-        </p:nvPicPr>
-        <p:blipFill>
-          <a:blip r:embed="rId2" cstate="email">
-            <a:extLst>
-              <a:ext uri="{28A0092B-C50C-407E-A947-70E740481C1C}">
-                <a14:useLocalDpi xmlns:a14="http://schemas.microsoft.com/office/drawing/2010/main" val="0"/>
-              </a:ext>
-            </a:extLst>
-          </a:blip>
-          <a:srcRect l="-45185" r="-45185"/>
-          <a:stretch>
-            <a:fillRect/>
-          </a:stretch>
-        </p:blipFill>
-        <p:spPr/>
-      </p:pic>
-      <p:pic>
-        <p:nvPicPr>
-          <p:cNvPr id="8" name="Content Placeholder 7" descr="Screen Shot2.png"/>
-          <p:cNvPicPr>
-            <a:picLocks noGrp="1" noChangeAspect="1"/>
-          </p:cNvPicPr>
-          <p:nvPr>
-            <p:ph sz="quarter" idx="4"/>
-          </p:nvPr>
-        </p:nvPicPr>
-        <p:blipFill>
-          <a:blip r:embed="rId3" cstate="email">
-            <a:extLst>
-              <a:ext uri="{28A0092B-C50C-407E-A947-70E740481C1C}">
-                <a14:useLocalDpi xmlns:a14="http://schemas.microsoft.com/office/drawing/2010/main" val="0"/>
-              </a:ext>
-            </a:extLst>
-          </a:blip>
-          <a:srcRect l="-46336" r="-46336"/>
-          <a:stretch>
-            <a:fillRect/>
-          </a:stretch>
-        </p:blipFill>
-        <p:spPr/>
-      </p:pic>
+              <a:t>Android Design Support Library</a:t>
+            </a:r>
+          </a:p>
+          <a:p>
+            <a:r>
+              <a:rPr lang="en-US" dirty="0" err="1" smtClean="0"/>
+              <a:t>AsyncTask</a:t>
+            </a:r>
+            <a:endParaRPr lang="en-US" dirty="0" smtClean="0"/>
+          </a:p>
+          <a:p>
+            <a:r>
+              <a:rPr lang="en-US" dirty="0" err="1" smtClean="0"/>
+              <a:t>ListView</a:t>
+            </a:r>
+            <a:endParaRPr lang="en-US" dirty="0" smtClean="0"/>
+          </a:p>
+          <a:p>
+            <a:r>
+              <a:rPr lang="en-US" dirty="0" smtClean="0"/>
+              <a:t>Toast</a:t>
+            </a:r>
+          </a:p>
+        </p:txBody>
+      </p:sp>
     </p:spTree>
     <p:extLst>
       <p:ext uri="{BB962C8B-B14F-4D97-AF65-F5344CB8AC3E}">
-        <p14:creationId xmlns:p14="http://schemas.microsoft.com/office/powerpoint/2010/main" val="920695708"/>
+        <p14:creationId xmlns:p14="http://schemas.microsoft.com/office/powerpoint/2010/main" val="2098945412"/>
       </p:ext>
     </p:extLst>
   </p:cSld>
   <p:clrMapOvr>
     <a:masterClrMapping/>
   </p:clrMapOvr>
-  <p:timing>
-    <p:tnLst>
-      <p:par>
-        <p:cTn id="1" dur="indefinite" restart="never" nodeType="tmRoot"/>
-      </p:par>
-    </p:tnLst>
-  </p:timing>
 </p:sld>
 </file>
 
@@ -5051,7 +5096,7 @@
           <a:p>
             <a:r>
               <a:rPr lang="en-US" dirty="0" smtClean="0"/>
-              <a:t>Screenshots (cont.)</a:t>
+              <a:t>Screenshots</a:t>
             </a:r>
             <a:endParaRPr lang="en-US" dirty="0"/>
           </a:p>
@@ -5075,7 +5120,7 @@
             <a:pPr algn="ctr"/>
             <a:r>
               <a:rPr lang="en-US" dirty="0" smtClean="0"/>
-              <a:t>Image Gallery</a:t>
+              <a:t>Logo Page</a:t>
             </a:r>
             <a:endParaRPr lang="en-US" dirty="0"/>
           </a:p>
@@ -5099,7 +5144,7 @@
             <a:pPr algn="ctr"/>
             <a:r>
               <a:rPr lang="en-US" dirty="0" smtClean="0"/>
-              <a:t>Search Option</a:t>
+              <a:t>PIN Page</a:t>
             </a:r>
             <a:endParaRPr lang="en-US" dirty="0"/>
           </a:p>
@@ -5107,7 +5152,7 @@
       </p:sp>
       <p:pic>
         <p:nvPicPr>
-          <p:cNvPr id="7" name="Content Placeholder 6" descr="Screen Shot3.png"/>
+          <p:cNvPr id="7" name="Content Placeholder 6" descr="Screen Shot1.png"/>
           <p:cNvPicPr>
             <a:picLocks noGrp="1" noChangeAspect="1"/>
           </p:cNvPicPr>
@@ -5123,7 +5168,7 @@
               </a:ext>
             </a:extLst>
           </a:blip>
-          <a:srcRect l="-46846" r="-46846"/>
+          <a:srcRect l="-45185" r="-45185"/>
           <a:stretch>
             <a:fillRect/>
           </a:stretch>
@@ -5132,7 +5177,7 @@
       </p:pic>
       <p:pic>
         <p:nvPicPr>
-          <p:cNvPr id="8" name="Content Placeholder 7" descr="Screen Shot4.png"/>
+          <p:cNvPr id="8" name="Content Placeholder 7" descr="Screen Shot2.png"/>
           <p:cNvPicPr>
             <a:picLocks noGrp="1" noChangeAspect="1"/>
           </p:cNvPicPr>
@@ -5148,7 +5193,7 @@
               </a:ext>
             </a:extLst>
           </a:blip>
-          <a:srcRect l="-45168" r="-45168"/>
+          <a:srcRect l="-46336" r="-46336"/>
           <a:stretch>
             <a:fillRect/>
           </a:stretch>
@@ -5158,7 +5203,7 @@
     </p:spTree>
     <p:extLst>
       <p:ext uri="{BB962C8B-B14F-4D97-AF65-F5344CB8AC3E}">
-        <p14:creationId xmlns:p14="http://schemas.microsoft.com/office/powerpoint/2010/main" val="2681269670"/>
+        <p14:creationId xmlns:p14="http://schemas.microsoft.com/office/powerpoint/2010/main" val="920695708"/>
       </p:ext>
     </p:extLst>
   </p:cSld>
@@ -5230,9 +5275,10 @@
           <a:bodyPr/>
           <a:lstStyle/>
           <a:p>
+            <a:pPr algn="ctr"/>
             <a:r>
               <a:rPr lang="en-US" dirty="0" smtClean="0"/>
-              <a:t>Type name of the image</a:t>
+              <a:t>Image Gallery</a:t>
             </a:r>
             <a:endParaRPr lang="en-US" dirty="0"/>
           </a:p>
@@ -5256,7 +5302,7 @@
             <a:pPr algn="ctr"/>
             <a:r>
               <a:rPr lang="en-US" dirty="0" smtClean="0"/>
-              <a:t>Searched Image </a:t>
+              <a:t>Search Option</a:t>
             </a:r>
             <a:endParaRPr lang="en-US" dirty="0"/>
           </a:p>
@@ -5264,7 +5310,7 @@
       </p:sp>
       <p:pic>
         <p:nvPicPr>
-          <p:cNvPr id="7" name="Content Placeholder 6" descr="Screen Shot5.png"/>
+          <p:cNvPr id="7" name="Content Placeholder 6" descr="Screen Shot3.png"/>
           <p:cNvPicPr>
             <a:picLocks noGrp="1" noChangeAspect="1"/>
           </p:cNvPicPr>
@@ -5280,7 +5326,7 @@
               </a:ext>
             </a:extLst>
           </a:blip>
-          <a:srcRect l="-44593" r="-44593"/>
+          <a:srcRect l="-46846" r="-46846"/>
           <a:stretch>
             <a:fillRect/>
           </a:stretch>
@@ -5289,7 +5335,7 @@
       </p:pic>
       <p:pic>
         <p:nvPicPr>
-          <p:cNvPr id="8" name="Content Placeholder 7" descr="Screen Shot6.png"/>
+          <p:cNvPr id="8" name="Content Placeholder 7" descr="Screen Shot4.png"/>
           <p:cNvPicPr>
             <a:picLocks noGrp="1" noChangeAspect="1"/>
           </p:cNvPicPr>
@@ -5305,7 +5351,7 @@
               </a:ext>
             </a:extLst>
           </a:blip>
-          <a:srcRect l="-43098" r="-43098"/>
+          <a:srcRect l="-45168" r="-45168"/>
           <a:stretch>
             <a:fillRect/>
           </a:stretch>
@@ -5315,7 +5361,7 @@
     </p:spTree>
     <p:extLst>
       <p:ext uri="{BB962C8B-B14F-4D97-AF65-F5344CB8AC3E}">
-        <p14:creationId xmlns:p14="http://schemas.microsoft.com/office/powerpoint/2010/main" val="4200826094"/>
+        <p14:creationId xmlns:p14="http://schemas.microsoft.com/office/powerpoint/2010/main" val="2681269670"/>
       </p:ext>
     </p:extLst>
   </p:cSld>
@@ -5366,7 +5412,7 @@
           <a:p>
             <a:r>
               <a:rPr lang="en-US" dirty="0" smtClean="0"/>
-              <a:t>Development Status</a:t>
+              <a:t>Screenshots (cont.)</a:t>
             </a:r>
             <a:endParaRPr lang="en-US" dirty="0"/>
           </a:p>
@@ -5374,74 +5420,105 @@
       </p:sp>
       <p:sp>
         <p:nvSpPr>
-          <p:cNvPr id="3" name="Content Placeholder 2"/>
-          <p:cNvSpPr>
-            <a:spLocks noGrp="1"/>
-          </p:cNvSpPr>
-          <p:nvPr>
-            <p:ph idx="1"/>
-          </p:nvPr>
-        </p:nvSpPr>
-        <p:spPr/>
-        <p:txBody>
-          <a:bodyPr/>
-          <a:lstStyle/>
-          <a:p>
-            <a:pPr>
-              <a:lnSpc>
-                <a:spcPct val="120000"/>
-              </a:lnSpc>
-            </a:pPr>
+          <p:cNvPr id="3" name="Text Placeholder 2"/>
+          <p:cNvSpPr>
+            <a:spLocks noGrp="1"/>
+          </p:cNvSpPr>
+          <p:nvPr>
+            <p:ph type="body" idx="1"/>
+          </p:nvPr>
+        </p:nvSpPr>
+        <p:spPr/>
+        <p:txBody>
+          <a:bodyPr/>
+          <a:lstStyle/>
+          <a:p>
             <a:r>
               <a:rPr lang="en-US" dirty="0" smtClean="0"/>
-              <a:t>Logo </a:t>
-            </a:r>
+              <a:t>Type name of the image</a:t>
+            </a:r>
+            <a:endParaRPr lang="en-US" dirty="0"/>
+          </a:p>
+        </p:txBody>
+      </p:sp>
+      <p:sp>
+        <p:nvSpPr>
+          <p:cNvPr id="4" name="Text Placeholder 3"/>
+          <p:cNvSpPr>
+            <a:spLocks noGrp="1"/>
+          </p:cNvSpPr>
+          <p:nvPr>
+            <p:ph type="body" sz="half" idx="3"/>
+          </p:nvPr>
+        </p:nvSpPr>
+        <p:spPr/>
+        <p:txBody>
+          <a:bodyPr/>
+          <a:lstStyle/>
+          <a:p>
+            <a:pPr algn="ctr"/>
             <a:r>
               <a:rPr lang="en-US" dirty="0" smtClean="0"/>
-              <a:t>Activity</a:t>
-            </a:r>
-            <a:endParaRPr lang="en-US" dirty="0" smtClean="0"/>
-          </a:p>
-          <a:p>
-            <a:pPr>
-              <a:lnSpc>
-                <a:spcPct val="120000"/>
-              </a:lnSpc>
-            </a:pPr>
-            <a:r>
-              <a:rPr lang="en-US" dirty="0" smtClean="0"/>
-              <a:t>Authentication Activity (using PIN)</a:t>
-            </a:r>
-          </a:p>
-          <a:p>
-            <a:pPr>
-              <a:lnSpc>
-                <a:spcPct val="120000"/>
-              </a:lnSpc>
-            </a:pPr>
-            <a:r>
-              <a:rPr lang="en-US" dirty="0" smtClean="0"/>
-              <a:t>Home Activity with Image Feed</a:t>
-            </a:r>
-          </a:p>
-          <a:p>
-            <a:pPr>
-              <a:lnSpc>
-                <a:spcPct val="120000"/>
-              </a:lnSpc>
-            </a:pPr>
-            <a:r>
-              <a:rPr lang="en-US" dirty="0" smtClean="0"/>
-              <a:t>Search Activity with Remote File-System</a:t>
-            </a:r>
-            <a:endParaRPr lang="en-US" dirty="0" smtClean="0"/>
-          </a:p>
-        </p:txBody>
-      </p:sp>
+              <a:t>Searched Image </a:t>
+            </a:r>
+            <a:endParaRPr lang="en-US" dirty="0"/>
+          </a:p>
+        </p:txBody>
+      </p:sp>
+      <p:pic>
+        <p:nvPicPr>
+          <p:cNvPr id="7" name="Content Placeholder 6" descr="Screen Shot5.png"/>
+          <p:cNvPicPr>
+            <a:picLocks noGrp="1" noChangeAspect="1"/>
+          </p:cNvPicPr>
+          <p:nvPr>
+            <p:ph sz="quarter" idx="2"/>
+          </p:nvPr>
+        </p:nvPicPr>
+        <p:blipFill>
+          <a:blip r:embed="rId2" cstate="email">
+            <a:extLst>
+              <a:ext uri="{28A0092B-C50C-407E-A947-70E740481C1C}">
+                <a14:useLocalDpi xmlns:a14="http://schemas.microsoft.com/office/drawing/2010/main" val="0"/>
+              </a:ext>
+            </a:extLst>
+          </a:blip>
+          <a:srcRect l="-44593" r="-44593"/>
+          <a:stretch>
+            <a:fillRect/>
+          </a:stretch>
+        </p:blipFill>
+        <p:spPr/>
+      </p:pic>
+      <p:pic>
+        <p:nvPicPr>
+          <p:cNvPr id="8" name="Content Placeholder 7" descr="Screen Shot6.png"/>
+          <p:cNvPicPr>
+            <a:picLocks noGrp="1" noChangeAspect="1"/>
+          </p:cNvPicPr>
+          <p:nvPr>
+            <p:ph sz="quarter" idx="4"/>
+          </p:nvPr>
+        </p:nvPicPr>
+        <p:blipFill>
+          <a:blip r:embed="rId3" cstate="email">
+            <a:extLst>
+              <a:ext uri="{28A0092B-C50C-407E-A947-70E740481C1C}">
+                <a14:useLocalDpi xmlns:a14="http://schemas.microsoft.com/office/drawing/2010/main" val="0"/>
+              </a:ext>
+            </a:extLst>
+          </a:blip>
+          <a:srcRect l="-43098" r="-43098"/>
+          <a:stretch>
+            <a:fillRect/>
+          </a:stretch>
+        </p:blipFill>
+        <p:spPr/>
+      </p:pic>
     </p:spTree>
     <p:extLst>
       <p:ext uri="{BB962C8B-B14F-4D97-AF65-F5344CB8AC3E}">
-        <p14:creationId xmlns:p14="http://schemas.microsoft.com/office/powerpoint/2010/main" val="3231469236"/>
+        <p14:creationId xmlns:p14="http://schemas.microsoft.com/office/powerpoint/2010/main" val="4200826094"/>
       </p:ext>
     </p:extLst>
   </p:cSld>

</xml_diff>